<commit_message>
TOM 20 neue Lizenzen eingepflegt
</commit_message>
<xml_diff>
--- a/training-cards/music moves/Tomatoes (TOM)/ger/apprentice/ger_TOM_20_Spiele_mit_dem_Plan_AM_A.pptx
+++ b/training-cards/music moves/Tomatoes (TOM)/ger/apprentice/ger_TOM_20_Spiele_mit_dem_Plan_AM_A.pptx
@@ -169,10 +169,9 @@
           </a:lstStyle>
           <a:p>
             <a:r>
-              <a:rPr lang="de-DE" dirty="0" smtClean="0"/>
+              <a:rPr lang="de-DE" dirty="0"/>
               <a:t>TITEL HINZUFÜGEN</a:t>
             </a:r>
-            <a:endParaRPr lang="de-DE" dirty="0"/>
           </a:p>
         </p:txBody>
       </p:sp>
@@ -203,35 +202,35 @@
           <a:p>
             <a:pPr lvl="0"/>
             <a:r>
-              <a:rPr lang="de-DE" smtClean="0"/>
+              <a:rPr lang="de-DE"/>
               <a:t>Mastertextformat bearbeiten</a:t>
             </a:r>
           </a:p>
           <a:p>
             <a:pPr lvl="1"/>
             <a:r>
-              <a:rPr lang="de-DE" smtClean="0"/>
+              <a:rPr lang="de-DE"/>
               <a:t>Zweite Ebene</a:t>
             </a:r>
           </a:p>
           <a:p>
             <a:pPr lvl="2"/>
             <a:r>
-              <a:rPr lang="de-DE" smtClean="0"/>
+              <a:rPr lang="de-DE"/>
               <a:t>Dritte Ebene</a:t>
             </a:r>
           </a:p>
           <a:p>
             <a:pPr lvl="3"/>
             <a:r>
-              <a:rPr lang="de-DE" smtClean="0"/>
+              <a:rPr lang="de-DE"/>
               <a:t>Vierte Ebene</a:t>
             </a:r>
           </a:p>
           <a:p>
             <a:pPr lvl="4"/>
             <a:r>
-              <a:rPr lang="de-DE" smtClean="0"/>
+              <a:rPr lang="de-DE"/>
               <a:t>Fünfte Ebene</a:t>
             </a:r>
             <a:endParaRPr lang="de-DE" dirty="0"/>
@@ -278,7 +277,7 @@
               <a:buNone/>
             </a:pPr>
             <a:r>
-              <a:rPr lang="de-DE" smtClean="0"/>
+              <a:rPr lang="de-DE"/>
               <a:t>Master-Untertitelformat bearbeiten</a:t>
             </a:r>
             <a:endParaRPr lang="de-DE" dirty="0"/>
@@ -394,35 +393,35 @@
           <a:p>
             <a:pPr lvl="0"/>
             <a:r>
-              <a:rPr lang="de-DE" smtClean="0"/>
+              <a:rPr lang="de-DE"/>
               <a:t>Mastertextformat bearbeiten</a:t>
             </a:r>
           </a:p>
           <a:p>
             <a:pPr lvl="1"/>
             <a:r>
-              <a:rPr lang="de-DE" smtClean="0"/>
+              <a:rPr lang="de-DE"/>
               <a:t>Zweite Ebene</a:t>
             </a:r>
           </a:p>
           <a:p>
             <a:pPr lvl="2"/>
             <a:r>
-              <a:rPr lang="de-DE" smtClean="0"/>
+              <a:rPr lang="de-DE"/>
               <a:t>Dritte Ebene</a:t>
             </a:r>
           </a:p>
           <a:p>
             <a:pPr lvl="3"/>
             <a:r>
-              <a:rPr lang="de-DE" smtClean="0"/>
+              <a:rPr lang="de-DE"/>
               <a:t>Vierte Ebene</a:t>
             </a:r>
           </a:p>
           <a:p>
             <a:pPr lvl="4"/>
             <a:r>
-              <a:rPr lang="de-DE" smtClean="0"/>
+              <a:rPr lang="de-DE"/>
               <a:t>Fünfte Ebene</a:t>
             </a:r>
             <a:endParaRPr lang="de-DE" dirty="0"/>
@@ -452,7 +451,7 @@
           <a:lstStyle/>
           <a:p>
             <a:r>
-              <a:rPr lang="de-DE" sz="2400" dirty="0" smtClean="0">
+              <a:rPr lang="de-DE" sz="2400" dirty="0">
                 <a:solidFill>
                   <a:srgbClr val="7E006B"/>
                 </a:solidFill>
@@ -462,7 +461,7 @@
               <a:t>TRAININGS</a:t>
             </a:r>
             <a:r>
-              <a:rPr lang="de-DE" sz="2400" dirty="0" smtClean="0">
+              <a:rPr lang="de-DE" sz="2400" dirty="0">
                 <a:solidFill>
                   <a:srgbClr val="7E006B"/>
                 </a:solidFill>
@@ -513,14 +512,20 @@
       </p:pic>
       <p:sp>
         <p:nvSpPr>
-          <p:cNvPr id="5" name="Shape 7"/>
+          <p:cNvPr id="4" name="Shape 7">
+            <a:extLst>
+              <a:ext uri="{FF2B5EF4-FFF2-40B4-BE49-F238E27FC236}">
+                <a16:creationId xmlns:a16="http://schemas.microsoft.com/office/drawing/2014/main" id="{21F17084-F4D4-A871-83EC-EE6CD2346627}"/>
+              </a:ext>
+            </a:extLst>
+          </p:cNvPr>
           <p:cNvSpPr/>
           <p:nvPr userDrawn="1"/>
         </p:nvSpPr>
         <p:spPr>
           <a:xfrm>
-            <a:off x="1683417" y="4952581"/>
-            <a:ext cx="4196016" cy="276995"/>
+            <a:off x="971550" y="4689585"/>
+            <a:ext cx="4691860" cy="461661"/>
           </a:xfrm>
           <a:prstGeom prst="rect">
             <a:avLst/>
@@ -530,12 +535,12 @@
           </a:ln>
           <a:extLst>
             <a:ext uri="{C572A759-6A51-4108-AA02-DFA0A04FC94B}">
-              <ma14:wrappingTextBoxFlag xmlns:ma14="http://schemas.microsoft.com/office/mac/drawingml/2011/main" val="1"/>
+              <ma14:wrappingTextBoxFlag xmlns:ma14="http://schemas.microsoft.com/office/mac/drawingml/2011/main" xmlns="" val="1"/>
             </a:ext>
           </a:extLst>
         </p:spPr>
         <p:txBody>
-          <a:bodyPr wrap="none" lIns="45718" tIns="45718" rIns="45718" bIns="45718">
+          <a:bodyPr wrap="square" lIns="45718" tIns="45718" rIns="45718" bIns="45718">
             <a:spAutoFit/>
           </a:bodyPr>
           <a:lstStyle/>
@@ -544,49 +549,266 @@
               <a:defRPr sz="1800"/>
             </a:pPr>
             <a:r>
-              <a:rPr sz="600" dirty="0">
-                <a:latin typeface="Avenir Light"/>
+              <a:rPr lang="de-DE" sz="800" b="0" i="0" u="none" strike="noStrike" dirty="0" err="1">
+                <a:solidFill>
+                  <a:schemeClr val="tx1">
+                    <a:lumMod val="65000"/>
+                    <a:lumOff val="35000"/>
+                  </a:schemeClr>
+                </a:solidFill>
+                <a:effectLst/>
+                <a:latin typeface="Avenir Book" panose="02000503020000020003" pitchFamily="2" charset="0"/>
+              </a:rPr>
+              <a:t>music</a:t>
+            </a:r>
+            <a:r>
+              <a:rPr lang="de-DE" sz="800" b="0" i="0" u="none" strike="noStrike" dirty="0">
+                <a:solidFill>
+                  <a:schemeClr val="tx1">
+                    <a:lumMod val="65000"/>
+                    <a:lumOff val="35000"/>
+                  </a:schemeClr>
+                </a:solidFill>
+                <a:effectLst/>
+                <a:latin typeface="Avenir Book" panose="02000503020000020003" pitchFamily="2" charset="0"/>
+              </a:rPr>
+              <a:t> </a:t>
+            </a:r>
+            <a:r>
+              <a:rPr lang="de-DE" sz="800" b="0" i="0" u="none" strike="noStrike" dirty="0" err="1">
+                <a:solidFill>
+                  <a:schemeClr val="tx1">
+                    <a:lumMod val="65000"/>
+                    <a:lumOff val="35000"/>
+                  </a:schemeClr>
+                </a:solidFill>
+                <a:effectLst/>
+                <a:latin typeface="Avenir Book" panose="02000503020000020003" pitchFamily="2" charset="0"/>
+              </a:rPr>
+              <a:t>moves</a:t>
+            </a:r>
+            <a:r>
+              <a:rPr lang="de-DE" sz="800" b="0" i="0" u="none" strike="noStrike" dirty="0">
+                <a:solidFill>
+                  <a:schemeClr val="tx1">
+                    <a:lumMod val="65000"/>
+                    <a:lumOff val="35000"/>
+                  </a:schemeClr>
+                </a:solidFill>
+                <a:effectLst/>
+                <a:latin typeface="Avenir Book" panose="02000503020000020003" pitchFamily="2" charset="0"/>
+              </a:rPr>
+              <a:t>-Trainingskarten von Regina Brandhuber sind lizenziert unter einer Creative Commons </a:t>
+            </a:r>
+          </a:p>
+          <a:p>
+            <a:pPr lvl="0" algn="ctr">
+              <a:defRPr sz="1800"/>
+            </a:pPr>
+            <a:r>
+              <a:rPr lang="de-DE" sz="800" b="0" i="0" u="none" strike="noStrike" dirty="0">
+                <a:solidFill>
+                  <a:schemeClr val="tx1">
+                    <a:lumMod val="65000"/>
+                    <a:lumOff val="35000"/>
+                  </a:schemeClr>
+                </a:solidFill>
+                <a:effectLst/>
+                <a:latin typeface="Avenir Book" panose="02000503020000020003" pitchFamily="2" charset="0"/>
+              </a:rPr>
+              <a:t>Namensnennung-Nicht kommerziell 4.0 International Lizenz.</a:t>
+            </a:r>
+          </a:p>
+          <a:p>
+            <a:pPr lvl="0" algn="ctr">
+              <a:defRPr sz="1800"/>
+            </a:pPr>
+            <a:r>
+              <a:rPr lang="de-DE" sz="800" dirty="0">
+                <a:solidFill>
+                  <a:schemeClr val="tx1">
+                    <a:lumMod val="65000"/>
+                    <a:lumOff val="35000"/>
+                  </a:schemeClr>
+                </a:solidFill>
+                <a:latin typeface="Avenir Book" panose="02000503020000020003" pitchFamily="2" charset="0"/>
                 <a:ea typeface="Calibri"/>
                 <a:cs typeface="Avenir Light"/>
                 <a:sym typeface="Calibri"/>
               </a:rPr>
-              <a:t>This work is licensed under the Creative Commons Attribution-NonCommercial-NoDerivatives 4.0 International License. </a:t>
-            </a:r>
-          </a:p>
-          <a:p>
-            <a:pPr lvl="0" algn="ctr">
-              <a:defRPr sz="1800"/>
-            </a:pPr>
-            <a:r>
-              <a:rPr sz="600" dirty="0">
-                <a:latin typeface="Avenir Light"/>
+              <a:t>Nachzulesen unter:</a:t>
+            </a:r>
+            <a:r>
+              <a:rPr sz="800" dirty="0">
+                <a:solidFill>
+                  <a:schemeClr val="tx1">
+                    <a:lumMod val="65000"/>
+                    <a:lumOff val="35000"/>
+                  </a:schemeClr>
+                </a:solidFill>
+                <a:latin typeface="Avenir Book" panose="02000503020000020003" pitchFamily="2" charset="0"/>
                 <a:ea typeface="Calibri"/>
                 <a:cs typeface="Avenir Light"/>
                 <a:sym typeface="Calibri"/>
               </a:rPr>
-              <a:t>To view a copy of this license, visit http://creativecommons.org/licenses/by-nc-nd/4.0/.</a:t>
-            </a:r>
+              <a:t> </a:t>
+            </a:r>
+            <a:r>
+              <a:rPr lang="de-DE" sz="800" dirty="0">
+                <a:solidFill>
+                  <a:schemeClr val="tx1">
+                    <a:lumMod val="65000"/>
+                    <a:lumOff val="35000"/>
+                  </a:schemeClr>
+                </a:solidFill>
+                <a:latin typeface="Avenir Book" panose="02000503020000020003" pitchFamily="2" charset="0"/>
+                <a:ea typeface="Calibri"/>
+                <a:cs typeface="Avenir Light"/>
+                <a:sym typeface="Calibri"/>
+              </a:rPr>
+              <a:t>https://</a:t>
+            </a:r>
+            <a:r>
+              <a:rPr lang="de-DE" sz="800" dirty="0" err="1">
+                <a:solidFill>
+                  <a:schemeClr val="tx1">
+                    <a:lumMod val="65000"/>
+                    <a:lumOff val="35000"/>
+                  </a:schemeClr>
+                </a:solidFill>
+                <a:latin typeface="Avenir Book" panose="02000503020000020003" pitchFamily="2" charset="0"/>
+                <a:ea typeface="Calibri"/>
+                <a:cs typeface="Avenir Light"/>
+                <a:sym typeface="Calibri"/>
+              </a:rPr>
+              <a:t>creativecommons.org</a:t>
+            </a:r>
+            <a:r>
+              <a:rPr lang="de-DE" sz="800" dirty="0">
+                <a:solidFill>
+                  <a:schemeClr val="tx1">
+                    <a:lumMod val="65000"/>
+                    <a:lumOff val="35000"/>
+                  </a:schemeClr>
+                </a:solidFill>
+                <a:latin typeface="Avenir Book" panose="02000503020000020003" pitchFamily="2" charset="0"/>
+                <a:ea typeface="Calibri"/>
+                <a:cs typeface="Avenir Light"/>
+                <a:sym typeface="Calibri"/>
+              </a:rPr>
+              <a:t>/</a:t>
+            </a:r>
+            <a:r>
+              <a:rPr lang="de-DE" sz="800" dirty="0" err="1">
+                <a:solidFill>
+                  <a:schemeClr val="tx1">
+                    <a:lumMod val="65000"/>
+                    <a:lumOff val="35000"/>
+                  </a:schemeClr>
+                </a:solidFill>
+                <a:latin typeface="Avenir Book" panose="02000503020000020003" pitchFamily="2" charset="0"/>
+                <a:ea typeface="Calibri"/>
+                <a:cs typeface="Avenir Light"/>
+                <a:sym typeface="Calibri"/>
+              </a:rPr>
+              <a:t>licenses</a:t>
+            </a:r>
+            <a:r>
+              <a:rPr lang="de-DE" sz="800" dirty="0">
+                <a:solidFill>
+                  <a:schemeClr val="tx1">
+                    <a:lumMod val="65000"/>
+                    <a:lumOff val="35000"/>
+                  </a:schemeClr>
+                </a:solidFill>
+                <a:latin typeface="Avenir Book" panose="02000503020000020003" pitchFamily="2" charset="0"/>
+                <a:ea typeface="Calibri"/>
+                <a:cs typeface="Avenir Light"/>
+                <a:sym typeface="Calibri"/>
+              </a:rPr>
+              <a:t>/</a:t>
+            </a:r>
+            <a:r>
+              <a:rPr lang="de-DE" sz="800" dirty="0" err="1">
+                <a:solidFill>
+                  <a:schemeClr val="tx1">
+                    <a:lumMod val="65000"/>
+                    <a:lumOff val="35000"/>
+                  </a:schemeClr>
+                </a:solidFill>
+                <a:latin typeface="Avenir Book" panose="02000503020000020003" pitchFamily="2" charset="0"/>
+                <a:ea typeface="Calibri"/>
+                <a:cs typeface="Avenir Light"/>
+                <a:sym typeface="Calibri"/>
+              </a:rPr>
+              <a:t>by-nc</a:t>
+            </a:r>
+            <a:r>
+              <a:rPr lang="de-DE" sz="800" dirty="0">
+                <a:solidFill>
+                  <a:schemeClr val="tx1">
+                    <a:lumMod val="65000"/>
+                    <a:lumOff val="35000"/>
+                  </a:schemeClr>
+                </a:solidFill>
+                <a:latin typeface="Avenir Book" panose="02000503020000020003" pitchFamily="2" charset="0"/>
+                <a:ea typeface="Calibri"/>
+                <a:cs typeface="Avenir Light"/>
+                <a:sym typeface="Calibri"/>
+              </a:rPr>
+              <a:t>/4.0/</a:t>
+            </a:r>
+            <a:r>
+              <a:rPr lang="de-DE" sz="800" dirty="0" err="1">
+                <a:solidFill>
+                  <a:schemeClr val="tx1">
+                    <a:lumMod val="65000"/>
+                    <a:lumOff val="35000"/>
+                  </a:schemeClr>
+                </a:solidFill>
+                <a:latin typeface="Avenir Book" panose="02000503020000020003" pitchFamily="2" charset="0"/>
+                <a:ea typeface="Calibri"/>
+                <a:cs typeface="Avenir Light"/>
+                <a:sym typeface="Calibri"/>
+              </a:rPr>
+              <a:t>deed.de</a:t>
+            </a:r>
+            <a:endParaRPr sz="800" dirty="0">
+              <a:solidFill>
+                <a:schemeClr val="tx1">
+                  <a:lumMod val="65000"/>
+                  <a:lumOff val="35000"/>
+                </a:schemeClr>
+              </a:solidFill>
+              <a:latin typeface="Avenir Book" panose="02000503020000020003" pitchFamily="2" charset="0"/>
+              <a:ea typeface="Calibri"/>
+              <a:cs typeface="Avenir Light"/>
+              <a:sym typeface="Calibri"/>
+            </a:endParaRPr>
           </a:p>
         </p:txBody>
       </p:sp>
       <p:pic>
         <p:nvPicPr>
-          <p:cNvPr id="6" name="pasted-image.tif"/>
+          <p:cNvPr id="8" name="pasted-image.tif">
+            <a:extLst>
+              <a:ext uri="{FF2B5EF4-FFF2-40B4-BE49-F238E27FC236}">
+                <a16:creationId xmlns:a16="http://schemas.microsoft.com/office/drawing/2014/main" id="{1258F137-F0C3-AD5F-97F6-6FE2D6CD650F}"/>
+              </a:ext>
+            </a:extLst>
+          </p:cNvPr>
           <p:cNvPicPr/>
           <p:nvPr userDrawn="1"/>
         </p:nvPicPr>
-        <p:blipFill>
-          <a:blip r:embed="rId4">
-            <a:extLst/>
-          </a:blip>
-          <a:stretch>
-            <a:fillRect/>
-          </a:stretch>
+        <p:blipFill rotWithShape="1">
+          <a:blip r:embed="rId4"/>
+          <a:srcRect r="24777" b="-3233"/>
+          <a:stretch/>
         </p:blipFill>
         <p:spPr>
           <a:xfrm>
-            <a:off x="6174185" y="4992838"/>
-            <a:ext cx="886619" cy="214128"/>
+            <a:off x="5724347" y="4733926"/>
+            <a:ext cx="1009828" cy="333374"/>
           </a:xfrm>
           <a:prstGeom prst="rect">
             <a:avLst/>
@@ -596,58 +818,6 @@
           </a:ln>
         </p:spPr>
       </p:pic>
-      <p:sp>
-        <p:nvSpPr>
-          <p:cNvPr id="7" name="Textfeld 6"/>
-          <p:cNvSpPr txBox="1"/>
-          <p:nvPr userDrawn="1"/>
-        </p:nvSpPr>
-        <p:spPr>
-          <a:xfrm>
-            <a:off x="239285" y="4936890"/>
-            <a:ext cx="1044856" cy="276999"/>
-          </a:xfrm>
-          <a:prstGeom prst="rect">
-            <a:avLst/>
-          </a:prstGeom>
-          <a:noFill/>
-        </p:spPr>
-        <p:txBody>
-          <a:bodyPr wrap="square" rtlCol="0">
-            <a:spAutoFit/>
-          </a:bodyPr>
-          <a:lstStyle/>
-          <a:p>
-            <a:r>
-              <a:rPr lang="de-DE" sz="600" dirty="0">
-                <a:solidFill>
-                  <a:srgbClr val="5D5E5F"/>
-                </a:solidFill>
-                <a:latin typeface="Avenir Light"/>
-                <a:cs typeface="Avenir Light"/>
-              </a:rPr>
-              <a:t>Letzte Änderung: </a:t>
-            </a:r>
-            <a:fld id="{7A8C7DAC-E536-564C-B5B3-90E8FAB50562}" type="datetime1">
-              <a:rPr lang="de-DE" sz="600" smtClean="0">
-                <a:solidFill>
-                  <a:srgbClr val="5D5E5F"/>
-                </a:solidFill>
-                <a:latin typeface="Avenir Light"/>
-                <a:cs typeface="Avenir Light"/>
-              </a:rPr>
-              <a:t>22.02.16</a:t>
-            </a:fld>
-            <a:endParaRPr lang="de-DE" sz="600" dirty="0">
-              <a:solidFill>
-                <a:srgbClr val="5D5E5F"/>
-              </a:solidFill>
-              <a:latin typeface="Avenir Light"/>
-              <a:cs typeface="Avenir Light"/>
-            </a:endParaRPr>
-          </a:p>
-        </p:txBody>
-      </p:sp>
     </p:spTree>
     <p:extLst>
       <p:ext uri="{BB962C8B-B14F-4D97-AF65-F5344CB8AC3E}">
@@ -694,10 +864,9 @@
           <a:lstStyle/>
           <a:p>
             <a:r>
-              <a:rPr lang="de-DE" smtClean="0"/>
+              <a:rPr lang="de-DE"/>
               <a:t>Mastertitelformat bearbeiten</a:t>
             </a:r>
-            <a:endParaRPr lang="de-DE"/>
           </a:p>
         </p:txBody>
       </p:sp>
@@ -718,7 +887,7 @@
           <a:p>
             <a:fld id="{FF5B2BAF-DF38-0A48-A798-0C06E514FD52}" type="datetimeFigureOut">
               <a:rPr lang="de-DE" smtClean="0"/>
-              <a:t>22.02.16</a:t>
+              <a:t>22.07.23</a:t>
             </a:fld>
             <a:endParaRPr lang="de-DE" dirty="0"/>
           </a:p>
@@ -829,17 +998,16 @@
           <a:p>
             <a:pPr marL="0" lvl="0" algn="l"/>
             <a:r>
-              <a:rPr lang="de-DE" dirty="0" smtClean="0"/>
+              <a:rPr lang="de-DE" dirty="0"/>
               <a:t>Überschrift </a:t>
             </a:r>
             <a:br>
-              <a:rPr lang="de-DE" dirty="0" smtClean="0"/>
+              <a:rPr lang="de-DE" dirty="0"/>
             </a:br>
             <a:r>
-              <a:rPr lang="de-DE" dirty="0" smtClean="0"/>
+              <a:rPr lang="de-DE" dirty="0"/>
               <a:t>bearbeiten </a:t>
             </a:r>
-            <a:endParaRPr lang="de-DE" dirty="0"/>
           </a:p>
         </p:txBody>
       </p:sp>
@@ -870,38 +1038,37 @@
           <a:p>
             <a:pPr lvl="0"/>
             <a:r>
-              <a:rPr lang="de-DE" dirty="0" smtClean="0"/>
+              <a:rPr lang="de-DE" dirty="0"/>
               <a:t>Mastertextformat bearbeiten</a:t>
             </a:r>
           </a:p>
           <a:p>
             <a:pPr lvl="1"/>
             <a:r>
-              <a:rPr lang="de-DE" dirty="0" smtClean="0"/>
+              <a:rPr lang="de-DE" dirty="0"/>
               <a:t>Zweite Ebene</a:t>
             </a:r>
           </a:p>
           <a:p>
             <a:pPr lvl="2"/>
             <a:r>
-              <a:rPr lang="de-DE" dirty="0" smtClean="0"/>
+              <a:rPr lang="de-DE" dirty="0"/>
               <a:t>Dritte Ebene</a:t>
             </a:r>
           </a:p>
           <a:p>
             <a:pPr lvl="3"/>
             <a:r>
-              <a:rPr lang="de-DE" dirty="0" smtClean="0"/>
+              <a:rPr lang="de-DE" dirty="0"/>
               <a:t>Vierte Ebene</a:t>
             </a:r>
           </a:p>
           <a:p>
             <a:pPr lvl="4"/>
             <a:r>
-              <a:rPr lang="de-DE" dirty="0" smtClean="0"/>
+              <a:rPr lang="de-DE" dirty="0"/>
               <a:t>Fünfte Ebene</a:t>
             </a:r>
-            <a:endParaRPr lang="de-DE" dirty="0"/>
           </a:p>
         </p:txBody>
       </p:sp>
@@ -940,7 +1107,7 @@
           <a:p>
             <a:fld id="{FF5B2BAF-DF38-0A48-A798-0C06E514FD52}" type="datetimeFigureOut">
               <a:rPr lang="de-DE" smtClean="0"/>
-              <a:t>22.02.16</a:t>
+              <a:t>22.07.23</a:t>
             </a:fld>
             <a:endParaRPr lang="de-DE" dirty="0"/>
           </a:p>
@@ -1174,7 +1341,7 @@
           <a:lstStyle/>
           <a:p>
             <a:r>
-              <a:rPr lang="de-DE" sz="1050" b="1" dirty="0" smtClean="0">
+              <a:rPr lang="de-DE" sz="1050" b="1" dirty="0">
                 <a:solidFill>
                   <a:schemeClr val="bg1"/>
                 </a:solidFill>
@@ -1184,7 +1351,7 @@
               <a:t>TRAININGSKARTE</a:t>
             </a:r>
             <a:r>
-              <a:rPr lang="de-DE" sz="1050" dirty="0" smtClean="0">
+              <a:rPr lang="de-DE" sz="1050" dirty="0">
                 <a:solidFill>
                   <a:schemeClr val="bg1"/>
                 </a:solidFill>
@@ -1194,7 +1361,7 @@
               <a:t> </a:t>
             </a:r>
             <a:r>
-              <a:rPr lang="de-DE" sz="1050" b="1" dirty="0" smtClean="0">
+              <a:rPr lang="de-DE" sz="1050" b="1" dirty="0">
                 <a:solidFill>
                   <a:schemeClr val="bg1"/>
                 </a:solidFill>
@@ -1203,13 +1370,6 @@
               </a:rPr>
               <a:t>TOM 20</a:t>
             </a:r>
-            <a:endParaRPr lang="de-DE" sz="1050" b="1" dirty="0">
-              <a:solidFill>
-                <a:schemeClr val="bg1"/>
-              </a:solidFill>
-              <a:latin typeface="Avenir Heavy"/>
-              <a:cs typeface="Avenir Heavy"/>
-            </a:endParaRPr>
           </a:p>
         </p:txBody>
       </p:sp>
@@ -1592,17 +1752,16 @@
           <a:lstStyle/>
           <a:p>
             <a:r>
-              <a:rPr lang="de-DE" dirty="0" smtClean="0">
+              <a:rPr lang="de-DE" dirty="0">
                 <a:latin typeface="Avenir Heavy"/>
                 <a:cs typeface="Avenir Heavy"/>
               </a:rPr>
               <a:t>SPIELE MIT </a:t>
             </a:r>
             <a:r>
-              <a:rPr lang="de-DE" dirty="0" smtClean="0"/>
+              <a:rPr lang="de-DE" dirty="0"/>
               <a:t>DEM PLAN</a:t>
             </a:r>
-            <a:endParaRPr lang="de-DE" dirty="0"/>
           </a:p>
         </p:txBody>
       </p:sp>
@@ -1665,7 +1824,6 @@
               <a:rPr lang="de-DE" sz="1200" dirty="0"/>
               <a:t>Wie auch im Sport ist ein gutes Training, ein Training, das diese Ausfallserscheinungen nicht produziert.</a:t>
             </a:r>
-            <a:endParaRPr lang="de-DE" sz="1200" dirty="0"/>
           </a:p>
         </p:txBody>
       </p:sp>
@@ -1688,10 +1846,9 @@
               <a:buNone/>
             </a:pPr>
             <a:r>
-              <a:rPr lang="de-DE" dirty="0" smtClean="0"/>
+              <a:rPr lang="de-DE" dirty="0"/>
               <a:t>Regina Brandhuber</a:t>
             </a:r>
-            <a:endParaRPr lang="de-DE" dirty="0"/>
           </a:p>
         </p:txBody>
       </p:sp>
@@ -1747,28 +1904,18 @@
               <a:t>Plane zweimal eine halbe Woche am Stück.   </a:t>
             </a:r>
-            <a:endParaRPr lang="de-DE" sz="1200" dirty="0" smtClean="0"/>
-          </a:p>
-          <a:p>
-            <a:r>
-              <a:rPr lang="de-DE" sz="1200" dirty="0" smtClean="0"/>
-              <a:t>Lege </a:t>
-            </a:r>
+          </a:p>
+          <a:p>
             <a:r>
               <a:rPr lang="de-DE" sz="1200" dirty="0"/>
-              <a:t>fest, wie lange eine halbe Woche für dich dauert: 2, 3 oder 4 Tage. Nimm ein Maß, das Dir sehr leicht vorkommt. +              <a:t>Lege fest, wie lange eine halbe Woche für dich dauert: 2, 3 oder 4 Tage. Nimm ein Maß, das Dir sehr leicht vorkommt.  </a:t>
             </a:r>
-            <a:endParaRPr lang="de-DE" sz="1200" dirty="0" smtClean="0"/>
-          </a:p>
-          <a:p>
-            <a:r>
-              <a:rPr lang="de-DE" sz="1200" dirty="0" smtClean="0"/>
-              <a:t>Bestimme</a:t>
-            </a:r>
+          </a:p>
+          <a:p>
             <a:r>
               <a:rPr lang="de-DE" sz="1200" dirty="0"/>
-              <a:t>, bevor Du die Woche beginnst, die Wochentage, die du </a:t>
+              <a:t>Bestimme, bevor Du die Woche beginnst, die Wochentage, die du </a:t>
             </a:r>
             <a:r>
               <a:rPr lang="de-DE" sz="1200" dirty="0" err="1"/>
@@ -1779,16 +1926,11 @@
               <a:t> möchtest.  </a:t>
             </a:r>
-            <a:endParaRPr lang="de-DE" sz="1200" dirty="0" smtClean="0"/>
-          </a:p>
-          <a:p>
-            <a:r>
-              <a:rPr lang="de-DE" sz="1200" dirty="0" smtClean="0"/>
-              <a:t>Schätze </a:t>
-            </a:r>
+          </a:p>
+          <a:p>
             <a:r>
               <a:rPr lang="de-DE" sz="1200" dirty="0"/>
-              <a:t>für jeden Tag Deine Kapazität (z.B. in Tomaten, siehe TOM 19) und dokumentiere am Abend, wie Dein Tag tatsächlich verlaufen ist. </a:t>
+              <a:t>Schätze für jeden Tag Deine Kapazität (z.B. in Tomaten, siehe TOM 19) und dokumentiere am Abend, wie Dein Tag tatsächlich verlaufen ist. </a:t>
             </a:r>
           </a:p>
           <a:p>
@@ -1800,22 +1942,17 @@
               <a:rPr lang="de-DE" sz="1200"/>
               <a:t>Ihnen </a:t>
             </a:r>
-            <a:r>
-              <a:rPr lang="de-DE" sz="1200" smtClean="0"/>
-              <a:t/>
-            </a:r>
             <a:br>
-              <a:rPr lang="de-DE" sz="1200" smtClean="0"/>
+              <a:rPr lang="de-DE" sz="1200"/>
             </a:br>
             <a:r>
-              <a:rPr lang="de-DE" sz="1200" smtClean="0"/>
+              <a:rPr lang="de-DE" sz="1200"/>
               <a:t>darüber </a:t>
             </a:r>
             <a:r>
               <a:rPr lang="de-DE" sz="1200" dirty="0"/>
               <a:t>und lass Dich von Ihnen zertifizieren.</a:t>
             </a:r>
-            <a:endParaRPr lang="de-DE" sz="1200" dirty="0"/>
           </a:p>
         </p:txBody>
       </p:sp>

</xml_diff>